<commit_message>
Updated the presentation folder
</commit_message>
<xml_diff>
--- a/common_script/Presentation/FinalPresentation.pptx
+++ b/common_script/Presentation/FinalPresentation.pptx
@@ -8,7 +8,7 @@
     <p:sldMasterId id="2147483687" r:id="rId4"/>
   </p:sldMasterIdLst>
   <p:notesMasterIdLst>
-    <p:notesMasterId r:id="rId30"/>
+    <p:notesMasterId r:id="rId29"/>
   </p:notesMasterIdLst>
   <p:sldIdLst>
     <p:sldId id="256" r:id="rId5"/>
@@ -33,9 +33,8 @@
     <p:sldId id="275" r:id="rId24"/>
     <p:sldId id="279" r:id="rId25"/>
     <p:sldId id="276" r:id="rId26"/>
-    <p:sldId id="280" r:id="rId27"/>
-    <p:sldId id="277" r:id="rId28"/>
-    <p:sldId id="278" r:id="rId29"/>
+    <p:sldId id="277" r:id="rId27"/>
+    <p:sldId id="278" r:id="rId28"/>
   </p:sldIdLst>
   <p:sldSz cx="12192000" cy="6858000"/>
   <p:notesSz cx="6858000" cy="9144000"/>
@@ -134,11 +133,6 @@
       </a:defRPr>
     </a:lvl9pPr>
   </p:defaultTextStyle>
-  <p:extLst>
-    <p:ext uri="{EFAFB233-063F-42B5-8137-9DF3F51BA10A}">
-      <p15:sldGuideLst xmlns:p15="http://schemas.microsoft.com/office/powerpoint/2012/main"/>
-    </p:ext>
-  </p:extLst>
 </p:presentation>
 </file>
 
@@ -1148,7 +1142,7 @@
               <a:rPr lang="en-US" sz="1200" b="0" strike="noStrike" spc="-1">
                 <a:latin typeface="Times New Roman"/>
               </a:rPr>
-              <a:t>24</a:t>
+              <a:t>23</a:t>
             </a:fld>
             <a:endParaRPr lang="en-US" sz="1200" b="0" strike="noStrike" spc="-1">
               <a:latin typeface="Times New Roman"/>
@@ -18661,7 +18655,7 @@
               </a:lnSpc>
             </a:pPr>
             <a:r>
-              <a:rPr lang="en-US" sz="1400" b="1" strike="noStrike" spc="-1" dirty="0">
+              <a:rPr lang="en-US" sz="1400" b="1" strike="noStrike" spc="-1">
                 <a:solidFill>
                   <a:srgbClr val="000000"/>
                 </a:solidFill>
@@ -18670,7 +18664,7 @@
               </a:rPr>
               <a:t>Split happens when the available shortest path(SP) can not fully accommodate one user.</a:t>
             </a:r>
-            <a:endParaRPr lang="en-US" sz="1400" b="0" strike="noStrike" spc="-1" dirty="0">
+            <a:endParaRPr lang="en-US" sz="1400" b="0" strike="noStrike" spc="-1">
               <a:solidFill>
                 <a:srgbClr val="000000"/>
               </a:solidFill>
@@ -18684,7 +18678,7 @@
               </a:lnSpc>
             </a:pPr>
             <a:r>
-              <a:rPr lang="en-US" sz="1400" b="1" strike="noStrike" spc="-1" dirty="0">
+              <a:rPr lang="en-US" sz="1400" b="1" strike="noStrike" spc="-1">
                 <a:solidFill>
                   <a:srgbClr val="000000"/>
                 </a:solidFill>
@@ -18693,7 +18687,7 @@
               </a:rPr>
               <a:t>In our model:</a:t>
             </a:r>
-            <a:endParaRPr lang="en-US" sz="1400" b="0" strike="noStrike" spc="-1" dirty="0">
+            <a:endParaRPr lang="en-US" sz="1400" b="0" strike="noStrike" spc="-1">
               <a:solidFill>
                 <a:srgbClr val="000000"/>
               </a:solidFill>
@@ -18707,44 +18701,17 @@
               </a:lnSpc>
             </a:pPr>
             <a:r>
-              <a:rPr lang="en-US" sz="1400" b="1" strike="noStrike" spc="-1" dirty="0">
+              <a:rPr lang="en-US" sz="1400" b="1" strike="noStrike" spc="-1">
                 <a:solidFill>
                   <a:srgbClr val="000000"/>
                 </a:solidFill>
                 <a:latin typeface="Arial"/>
                 <a:ea typeface="Arial"/>
               </a:rPr>
-              <a:t>	Each node can serve/access at least one service. </a:t>
-            </a:r>
-          </a:p>
-          <a:p>
-            <a:pPr marL="609480" indent="-304560">
-              <a:lnSpc>
-                <a:spcPct val="100000"/>
-              </a:lnSpc>
-            </a:pPr>
-            <a:r>
-              <a:rPr lang="en-US" sz="1400" b="1" spc="-1" dirty="0">
-                <a:solidFill>
-                  <a:srgbClr val="000000"/>
-                </a:solidFill>
-                <a:latin typeface="Arial"/>
-                <a:ea typeface="Arial"/>
-              </a:rPr>
-              <a:t>	E</a:t>
-            </a:r>
-            <a:r>
-              <a:rPr lang="en-US" sz="1400" b="1" strike="noStrike" spc="-1" dirty="0">
-                <a:solidFill>
-                  <a:srgbClr val="000000"/>
-                </a:solidFill>
-                <a:latin typeface="Arial"/>
-                <a:ea typeface="Arial"/>
-              </a:rPr>
-              <a:t>ach node can serve all services, so service type does not matter for node. The value of each service matters. </a:t>
-            </a:r>
-            <a:r>
-              <a:rPr lang="en-US" sz="1400" b="1" strike="noStrike" spc="-1" dirty="0">
+              <a:t>	Each node can serve at least one service. Due to each node can serve all services, so service type does not matter for node. The value of each service matters. </a:t>
+            </a:r>
+            <a:r>
+              <a:rPr lang="en-US" sz="1400" b="1" strike="noStrike" spc="-1">
                 <a:solidFill>
                   <a:srgbClr val="000000"/>
                 </a:solidFill>
@@ -18754,7 +18721,7 @@
               <a:t></a:t>
             </a:r>
             <a:r>
-              <a:rPr lang="en-US" sz="1400" b="1" strike="noStrike" spc="-1" dirty="0">
+              <a:rPr lang="en-US" sz="1400" b="1" strike="noStrike" spc="-1">
                 <a:solidFill>
                   <a:srgbClr val="000000"/>
                 </a:solidFill>
@@ -18763,7 +18730,7 @@
               </a:rPr>
               <a:t>Only the Higher value flow effects the lower value flow</a:t>
             </a:r>
-            <a:endParaRPr lang="en-US" sz="1400" b="0" strike="noStrike" spc="-1" dirty="0">
+            <a:endParaRPr lang="en-US" sz="1400" b="0" strike="noStrike" spc="-1">
               <a:solidFill>
                 <a:srgbClr val="000000"/>
               </a:solidFill>
@@ -18776,7 +18743,7 @@
                 <a:spcPct val="100000"/>
               </a:lnSpc>
             </a:pPr>
-            <a:endParaRPr lang="en-US" sz="1400" b="0" strike="noStrike" spc="-1" dirty="0">
+            <a:endParaRPr lang="en-US" sz="1400" b="0" strike="noStrike" spc="-1">
               <a:solidFill>
                 <a:srgbClr val="000000"/>
               </a:solidFill>
@@ -18789,7 +18756,7 @@
                 <a:spcPct val="100000"/>
               </a:lnSpc>
             </a:pPr>
-            <a:endParaRPr lang="en-US" sz="1400" b="0" strike="noStrike" spc="-1" dirty="0">
+            <a:endParaRPr lang="en-US" sz="1400" b="0" strike="noStrike" spc="-1">
               <a:solidFill>
                 <a:srgbClr val="000000"/>
               </a:solidFill>
@@ -18803,7 +18770,7 @@
               </a:lnSpc>
             </a:pPr>
             <a:r>
-              <a:rPr lang="en-US" sz="1800" b="1" strike="noStrike" spc="-1" dirty="0">
+              <a:rPr lang="en-US" sz="1800" b="1" strike="noStrike" spc="-1">
                 <a:solidFill>
                   <a:srgbClr val="000000"/>
                 </a:solidFill>
@@ -18812,7 +18779,7 @@
               </a:rPr>
               <a:t>		Figure here</a:t>
             </a:r>
-            <a:endParaRPr lang="en-US" sz="1800" b="0" strike="noStrike" spc="-1" dirty="0">
+            <a:endParaRPr lang="en-US" sz="1800" b="0" strike="noStrike" spc="-1">
               <a:solidFill>
                 <a:srgbClr val="000000"/>
               </a:solidFill>
@@ -18853,7 +18820,7 @@
               </a:spcBef>
             </a:pPr>
             <a:r>
-              <a:rPr lang="en-US" sz="1200" b="1" strike="noStrike" spc="-1" dirty="0">
+              <a:rPr lang="en-US" sz="1200" b="1" strike="noStrike" spc="-1">
                 <a:solidFill>
                   <a:srgbClr val="000000"/>
                 </a:solidFill>
@@ -18862,7 +18829,7 @@
               </a:rPr>
               <a:t>Two cases:</a:t>
             </a:r>
-            <a:endParaRPr lang="en-US" sz="1200" b="0" strike="noStrike" spc="-1" dirty="0">
+            <a:endParaRPr lang="en-US" sz="1200" b="0" strike="noStrike" spc="-1">
               <a:solidFill>
                 <a:srgbClr val="000000"/>
               </a:solidFill>
@@ -18879,7 +18846,7 @@
               </a:spcBef>
             </a:pPr>
             <a:r>
-              <a:rPr lang="en-US" sz="1200" b="0" i="1" strike="noStrike" spc="-1" dirty="0">
+              <a:rPr lang="en-US" sz="1200" b="0" i="1" strike="noStrike" spc="-1">
                 <a:solidFill>
                   <a:srgbClr val="000000"/>
                 </a:solidFill>
@@ -18888,7 +18855,7 @@
               </a:rPr>
               <a:t>Path1 is the SP:</a:t>
             </a:r>
-            <a:endParaRPr lang="en-US" sz="1200" b="0" strike="noStrike" spc="-1" dirty="0">
+            <a:endParaRPr lang="en-US" sz="1200" b="0" strike="noStrike" spc="-1">
               <a:solidFill>
                 <a:srgbClr val="000000"/>
               </a:solidFill>
@@ -18905,46 +18872,36 @@
               </a:spcBef>
             </a:pPr>
             <a:r>
-              <a:rPr lang="en-US" sz="1200" b="0" strike="noStrike" spc="-1" dirty="0" err="1">
+              <a:rPr lang="en-US" sz="1200" b="0" strike="noStrike" spc="-1">
                 <a:solidFill>
                   <a:srgbClr val="000000"/>
                 </a:solidFill>
                 <a:latin typeface="Arial"/>
                 <a:ea typeface="Arial"/>
               </a:rPr>
-              <a:t>X.v</a:t>
-            </a:r>
-            <a:r>
-              <a:rPr lang="en-US" sz="1200" b="0" strike="noStrike" spc="-1" dirty="0">
+              <a:t>X.v = min{V</a:t>
+            </a:r>
+            <a:r>
+              <a:rPr lang="en-US" sz="1200" b="0" strike="noStrike" spc="-1" baseline="-25000">
                 <a:solidFill>
                   <a:srgbClr val="000000"/>
                 </a:solidFill>
                 <a:latin typeface="Arial"/>
                 <a:ea typeface="Arial"/>
               </a:rPr>
-              <a:t> = min{V</a:t>
-            </a:r>
-            <a:r>
-              <a:rPr lang="en-US" sz="1200" b="0" strike="noStrike" spc="-1" baseline="-25000" dirty="0">
+              <a:t>n1</a:t>
+            </a:r>
+            <a:r>
+              <a:rPr lang="en-US" sz="1200" b="0" strike="noStrike" spc="-1">
                 <a:solidFill>
                   <a:srgbClr val="000000"/>
                 </a:solidFill>
                 <a:latin typeface="Arial"/>
                 <a:ea typeface="Arial"/>
               </a:rPr>
-              <a:t>n1</a:t>
-            </a:r>
-            <a:r>
-              <a:rPr lang="en-US" sz="1200" b="0" strike="noStrike" spc="-1" dirty="0">
-                <a:solidFill>
-                  <a:srgbClr val="000000"/>
-                </a:solidFill>
-                <a:latin typeface="Arial"/>
-                <a:ea typeface="Arial"/>
-              </a:rPr>
               <a:t>}</a:t>
             </a:r>
-            <a:endParaRPr lang="en-US" sz="1200" b="0" strike="noStrike" spc="-1" dirty="0">
+            <a:endParaRPr lang="en-US" sz="1200" b="0" strike="noStrike" spc="-1">
               <a:solidFill>
                 <a:srgbClr val="000000"/>
               </a:solidFill>
@@ -18961,56 +18918,16 @@
               </a:spcBef>
             </a:pPr>
             <a:r>
-              <a:rPr lang="en-US" sz="1200" b="0" strike="noStrike" spc="-1" dirty="0">
+              <a:rPr lang="en-US" sz="1200" b="0" strike="noStrike" spc="-1">
                 <a:solidFill>
                   <a:srgbClr val="000000"/>
                 </a:solidFill>
                 <a:latin typeface="Arial"/>
                 <a:ea typeface="Arial"/>
               </a:rPr>
-              <a:t>	Decrease 0.1x to 0, then due to </a:t>
-            </a:r>
-            <a:r>
-              <a:rPr lang="en-US" sz="1200" b="0" strike="noStrike" spc="-1" dirty="0" err="1">
-                <a:solidFill>
-                  <a:srgbClr val="000000"/>
-                </a:solidFill>
-                <a:latin typeface="Arial"/>
-                <a:ea typeface="Arial"/>
-              </a:rPr>
-              <a:t>X.v</a:t>
-            </a:r>
-            <a:r>
-              <a:rPr lang="en-US" sz="1200" b="0" strike="noStrike" spc="-1" dirty="0">
-                <a:solidFill>
-                  <a:srgbClr val="000000"/>
-                </a:solidFill>
-                <a:latin typeface="Arial"/>
-                <a:ea typeface="Arial"/>
-              </a:rPr>
-              <a:t> = min{V_n1}, 0.9x can not increase(not infect </a:t>
-            </a:r>
-            <a:r>
-              <a:rPr lang="en-US" sz="1200" b="0" strike="noStrike" spc="-1" dirty="0" err="1">
-                <a:solidFill>
-                  <a:srgbClr val="000000"/>
-                </a:solidFill>
-                <a:latin typeface="Arial"/>
-                <a:ea typeface="Arial"/>
-              </a:rPr>
-              <a:t>y,z,t</a:t>
-            </a:r>
-            <a:r>
-              <a:rPr lang="en-US" sz="1200" b="0" strike="noStrike" spc="-1" dirty="0">
-                <a:solidFill>
-                  <a:srgbClr val="000000"/>
-                </a:solidFill>
-                <a:latin typeface="Arial"/>
-                <a:ea typeface="Arial"/>
-              </a:rPr>
-              <a:t>).</a:t>
-            </a:r>
-            <a:endParaRPr lang="en-US" sz="1200" b="0" strike="noStrike" spc="-1" dirty="0">
+              <a:t>	Decrease 0.1x to 0, then due to X.v = min{V_n1}, 0.9x can not increase(not infect y,z,t).</a:t>
+            </a:r>
+            <a:endParaRPr lang="en-US" sz="1200" b="0" strike="noStrike" spc="-1">
               <a:solidFill>
                 <a:srgbClr val="000000"/>
               </a:solidFill>
@@ -19027,7 +18944,7 @@
               </a:spcBef>
             </a:pPr>
             <a:r>
-              <a:rPr lang="en-US" sz="1200" b="0" strike="noStrike" spc="-1" dirty="0">
+              <a:rPr lang="en-US" sz="1200" b="0" strike="noStrike" spc="-1">
                 <a:solidFill>
                   <a:srgbClr val="000000"/>
                 </a:solidFill>
@@ -19037,7 +18954,7 @@
               <a:t>	sum{flow of user x}&lt;1 drop off in the future iteration. </a:t>
             </a:r>
             <a:r>
-              <a:rPr lang="en-US" sz="1200" b="0" strike="noStrike" spc="-1" dirty="0">
+              <a:rPr lang="en-US" sz="1200" b="0" strike="noStrike" spc="-1">
                 <a:solidFill>
                   <a:srgbClr val="000000"/>
                 </a:solidFill>
@@ -19047,7 +18964,7 @@
               <a:t></a:t>
             </a:r>
             <a:r>
-              <a:rPr lang="en-US" sz="1200" b="1" strike="noStrike" spc="-1" dirty="0">
+              <a:rPr lang="en-US" sz="1200" b="1" strike="noStrike" spc="-1">
                 <a:solidFill>
                   <a:srgbClr val="000000"/>
                 </a:solidFill>
@@ -19056,7 +18973,7 @@
               </a:rPr>
               <a:t>property 1</a:t>
             </a:r>
-            <a:endParaRPr lang="en-US" sz="1200" b="0" strike="noStrike" spc="-1" dirty="0">
+            <a:endParaRPr lang="en-US" sz="1200" b="0" strike="noStrike" spc="-1">
               <a:solidFill>
                 <a:srgbClr val="000000"/>
               </a:solidFill>
@@ -19072,7 +18989,7 @@
                 <a:spcPts val="799"/>
               </a:spcBef>
             </a:pPr>
-            <a:endParaRPr lang="en-US" sz="1200" b="0" strike="noStrike" spc="-1" dirty="0">
+            <a:endParaRPr lang="en-US" sz="1200" b="0" strike="noStrike" spc="-1">
               <a:solidFill>
                 <a:srgbClr val="000000"/>
               </a:solidFill>
@@ -19089,7 +19006,7 @@
               </a:spcBef>
             </a:pPr>
             <a:r>
-              <a:rPr lang="en-US" sz="1200" b="0" i="1" strike="noStrike" spc="-1" dirty="0">
+              <a:rPr lang="en-US" sz="1200" b="0" i="1" strike="noStrike" spc="-1">
                 <a:solidFill>
                   <a:srgbClr val="000000"/>
                 </a:solidFill>
@@ -19098,7 +19015,7 @@
               </a:rPr>
               <a:t>Path 2 is the SP:</a:t>
             </a:r>
-            <a:endParaRPr lang="en-US" sz="1200" b="0" strike="noStrike" spc="-1" dirty="0">
+            <a:endParaRPr lang="en-US" sz="1200" b="0" strike="noStrike" spc="-1">
               <a:solidFill>
                 <a:srgbClr val="000000"/>
               </a:solidFill>
@@ -19115,46 +19032,36 @@
               </a:spcBef>
             </a:pPr>
             <a:r>
-              <a:rPr lang="en-US" sz="1200" b="0" strike="noStrike" spc="-1" dirty="0" err="1">
+              <a:rPr lang="en-US" sz="1200" b="0" strike="noStrike" spc="-1">
                 <a:solidFill>
                   <a:srgbClr val="000000"/>
                 </a:solidFill>
                 <a:latin typeface="Arial"/>
                 <a:ea typeface="Arial"/>
               </a:rPr>
-              <a:t>X.v</a:t>
-            </a:r>
-            <a:r>
-              <a:rPr lang="en-US" sz="1200" b="0" strike="noStrike" spc="-1" dirty="0">
+              <a:t>X.v = min{V</a:t>
+            </a:r>
+            <a:r>
+              <a:rPr lang="en-US" sz="1200" b="0" strike="noStrike" spc="-1" baseline="-25000">
                 <a:solidFill>
                   <a:srgbClr val="000000"/>
                 </a:solidFill>
                 <a:latin typeface="Arial"/>
                 <a:ea typeface="Arial"/>
               </a:rPr>
-              <a:t> = min{V</a:t>
-            </a:r>
-            <a:r>
-              <a:rPr lang="en-US" sz="1200" b="0" strike="noStrike" spc="-1" baseline="-25000" dirty="0">
+              <a:t>n2</a:t>
+            </a:r>
+            <a:r>
+              <a:rPr lang="en-US" sz="1200" b="0" strike="noStrike" spc="-1">
                 <a:solidFill>
                   <a:srgbClr val="000000"/>
                 </a:solidFill>
                 <a:latin typeface="Arial"/>
                 <a:ea typeface="Arial"/>
               </a:rPr>
-              <a:t>n2</a:t>
-            </a:r>
-            <a:r>
-              <a:rPr lang="en-US" sz="1200" b="0" strike="noStrike" spc="-1" dirty="0">
-                <a:solidFill>
-                  <a:srgbClr val="000000"/>
-                </a:solidFill>
-                <a:latin typeface="Arial"/>
-                <a:ea typeface="Arial"/>
-              </a:rPr>
               <a:t>}</a:t>
             </a:r>
-            <a:endParaRPr lang="en-US" sz="1200" b="0" strike="noStrike" spc="-1" dirty="0">
+            <a:endParaRPr lang="en-US" sz="1200" b="0" strike="noStrike" spc="-1">
               <a:solidFill>
                 <a:srgbClr val="000000"/>
               </a:solidFill>
@@ -19171,56 +19078,36 @@
               </a:spcBef>
             </a:pPr>
             <a:r>
-              <a:rPr lang="en-US" sz="1200" b="0" strike="noStrike" spc="-1" dirty="0">
+              <a:rPr lang="en-US" sz="1200" b="0" strike="noStrike" spc="-1">
                 <a:solidFill>
                   <a:srgbClr val="000000"/>
                 </a:solidFill>
                 <a:latin typeface="Arial"/>
                 <a:ea typeface="Arial"/>
               </a:rPr>
-              <a:t>	if </a:t>
-            </a:r>
-            <a:r>
-              <a:rPr lang="en-US" sz="1200" b="0" strike="noStrike" spc="-1" dirty="0" err="1">
+              <a:t>	if X.v = max{V</a:t>
+            </a:r>
+            <a:r>
+              <a:rPr lang="en-US" sz="1200" b="0" strike="noStrike" spc="-1" baseline="-25000">
                 <a:solidFill>
                   <a:srgbClr val="000000"/>
                 </a:solidFill>
                 <a:latin typeface="Arial"/>
                 <a:ea typeface="Arial"/>
               </a:rPr>
-              <a:t>X.v</a:t>
-            </a:r>
-            <a:r>
-              <a:rPr lang="en-US" sz="1200" b="0" strike="noStrike" spc="-1" dirty="0">
+              <a:t>n1</a:t>
+            </a:r>
+            <a:r>
+              <a:rPr lang="en-US" sz="1200" b="0" strike="noStrike" spc="-1">
                 <a:solidFill>
                   <a:srgbClr val="000000"/>
                 </a:solidFill>
                 <a:latin typeface="Arial"/>
                 <a:ea typeface="Arial"/>
               </a:rPr>
-              <a:t> = max{V</a:t>
-            </a:r>
-            <a:r>
-              <a:rPr lang="en-US" sz="1200" b="0" strike="noStrike" spc="-1" baseline="-25000" dirty="0">
-                <a:solidFill>
-                  <a:srgbClr val="000000"/>
-                </a:solidFill>
-                <a:latin typeface="Arial"/>
-                <a:ea typeface="Arial"/>
-              </a:rPr>
-              <a:t>n1</a:t>
-            </a:r>
-            <a:r>
-              <a:rPr lang="en-US" sz="1200" b="0" strike="noStrike" spc="-1" dirty="0">
-                <a:solidFill>
-                  <a:srgbClr val="000000"/>
-                </a:solidFill>
-                <a:latin typeface="Arial"/>
-                <a:ea typeface="Arial"/>
-              </a:rPr>
               <a:t>}</a:t>
             </a:r>
-            <a:endParaRPr lang="en-US" sz="1200" b="0" strike="noStrike" spc="-1" dirty="0">
+            <a:endParaRPr lang="en-US" sz="1200" b="0" strike="noStrike" spc="-1">
               <a:solidFill>
                 <a:srgbClr val="000000"/>
               </a:solidFill>
@@ -19237,7 +19124,7 @@
               </a:spcBef>
             </a:pPr>
             <a:r>
-              <a:rPr lang="en-US" sz="1200" b="0" strike="noStrike" spc="-1" dirty="0">
+              <a:rPr lang="en-US" sz="1200" b="0" strike="noStrike" spc="-1">
                 <a:solidFill>
                   <a:srgbClr val="000000"/>
                 </a:solidFill>
@@ -19247,7 +19134,7 @@
               <a:t>		decrease 0.1x to 0 will have 0.9x</a:t>
             </a:r>
             <a:r>
-              <a:rPr lang="en-US" sz="1200" b="0" strike="noStrike" spc="-1" dirty="0">
+              <a:rPr lang="en-US" sz="1200" b="0" strike="noStrike" spc="-1">
                 <a:solidFill>
                   <a:srgbClr val="000000"/>
                 </a:solidFill>
@@ -19257,7 +19144,7 @@
               <a:t></a:t>
             </a:r>
             <a:r>
-              <a:rPr lang="en-US" sz="1200" b="0" strike="noStrike" spc="-1" dirty="0">
+              <a:rPr lang="en-US" sz="1200" b="0" strike="noStrike" spc="-1">
                 <a:solidFill>
                   <a:srgbClr val="000000"/>
                 </a:solidFill>
@@ -19267,7 +19154,7 @@
               <a:t> (0.9+0.1)x </a:t>
             </a:r>
             <a:r>
-              <a:rPr lang="en-US" sz="1200" b="0" strike="noStrike" spc="-1" dirty="0">
+              <a:rPr lang="en-US" sz="1200" b="0" strike="noStrike" spc="-1">
                 <a:solidFill>
                   <a:srgbClr val="000000"/>
                 </a:solidFill>
@@ -19277,7 +19164,7 @@
               <a:t></a:t>
             </a:r>
             <a:r>
-              <a:rPr lang="en-US" sz="1200" b="1" strike="noStrike" spc="-1" dirty="0">
+              <a:rPr lang="en-US" sz="1200" b="1" strike="noStrike" spc="-1">
                 <a:solidFill>
                   <a:srgbClr val="000000"/>
                 </a:solidFill>
@@ -19286,7 +19173,7 @@
               </a:rPr>
               <a:t>property 2</a:t>
             </a:r>
-            <a:endParaRPr lang="en-US" sz="1200" b="0" strike="noStrike" spc="-1" dirty="0">
+            <a:endParaRPr lang="en-US" sz="1200" b="0" strike="noStrike" spc="-1">
               <a:solidFill>
                 <a:srgbClr val="000000"/>
               </a:solidFill>
@@ -19303,56 +19190,36 @@
               </a:spcBef>
             </a:pPr>
             <a:r>
-              <a:rPr lang="en-US" sz="1200" b="0" strike="noStrike" spc="-1" dirty="0">
+              <a:rPr lang="en-US" sz="1200" b="0" strike="noStrike" spc="-1">
                 <a:solidFill>
                   <a:srgbClr val="000000"/>
                 </a:solidFill>
                 <a:latin typeface="Arial"/>
                 <a:ea typeface="Arial"/>
               </a:rPr>
-              <a:t>	if </a:t>
-            </a:r>
-            <a:r>
-              <a:rPr lang="en-US" sz="1200" b="0" strike="noStrike" spc="-1" dirty="0" err="1">
+              <a:t>	if X.v = min{V</a:t>
+            </a:r>
+            <a:r>
+              <a:rPr lang="en-US" sz="1200" b="0" strike="noStrike" spc="-1" baseline="-25000">
                 <a:solidFill>
                   <a:srgbClr val="000000"/>
                 </a:solidFill>
                 <a:latin typeface="Arial"/>
                 <a:ea typeface="Arial"/>
               </a:rPr>
-              <a:t>X.v</a:t>
-            </a:r>
-            <a:r>
-              <a:rPr lang="en-US" sz="1200" b="0" strike="noStrike" spc="-1" dirty="0">
+              <a:t>n1</a:t>
+            </a:r>
+            <a:r>
+              <a:rPr lang="en-US" sz="1200" b="0" strike="noStrike" spc="-1">
                 <a:solidFill>
                   <a:srgbClr val="000000"/>
                 </a:solidFill>
                 <a:latin typeface="Arial"/>
                 <a:ea typeface="Arial"/>
               </a:rPr>
-              <a:t> = min{V</a:t>
-            </a:r>
-            <a:r>
-              <a:rPr lang="en-US" sz="1200" b="0" strike="noStrike" spc="-1" baseline="-25000" dirty="0">
-                <a:solidFill>
-                  <a:srgbClr val="000000"/>
-                </a:solidFill>
-                <a:latin typeface="Arial"/>
-                <a:ea typeface="Arial"/>
-              </a:rPr>
-              <a:t>n1</a:t>
-            </a:r>
-            <a:r>
-              <a:rPr lang="en-US" sz="1200" b="0" strike="noStrike" spc="-1" dirty="0">
-                <a:solidFill>
-                  <a:srgbClr val="000000"/>
-                </a:solidFill>
-                <a:latin typeface="Arial"/>
-                <a:ea typeface="Arial"/>
-              </a:rPr>
               <a:t>}</a:t>
             </a:r>
-            <a:endParaRPr lang="en-US" sz="1200" b="0" strike="noStrike" spc="-1" dirty="0">
+            <a:endParaRPr lang="en-US" sz="1200" b="0" strike="noStrike" spc="-1">
               <a:solidFill>
                 <a:srgbClr val="000000"/>
               </a:solidFill>
@@ -19369,37 +19236,17 @@
               </a:spcBef>
             </a:pPr>
             <a:r>
-              <a:rPr lang="en-US" sz="1200" b="0" strike="noStrike" spc="-1" dirty="0">
+              <a:rPr lang="en-US" sz="1200" b="0" strike="noStrike" spc="-1">
                 <a:solidFill>
                   <a:srgbClr val="000000"/>
                 </a:solidFill>
                 <a:latin typeface="Arial"/>
                 <a:ea typeface="Arial"/>
               </a:rPr>
-              <a:t>		decrease 0.1x to 0 will not infect </a:t>
-            </a:r>
-            <a:r>
-              <a:rPr lang="en-US" sz="1200" b="0" strike="noStrike" spc="-1" dirty="0" err="1">
-                <a:solidFill>
-                  <a:srgbClr val="000000"/>
-                </a:solidFill>
-                <a:latin typeface="Arial"/>
-                <a:ea typeface="Arial"/>
-              </a:rPr>
-              <a:t>y,z,t</a:t>
-            </a:r>
-            <a:r>
-              <a:rPr lang="en-US" sz="1200" b="0" strike="noStrike" spc="-1" dirty="0">
-                <a:solidFill>
-                  <a:srgbClr val="000000"/>
-                </a:solidFill>
-                <a:latin typeface="Arial"/>
-                <a:ea typeface="Arial"/>
-              </a:rPr>
-              <a:t> .Then 0.9x will be kept and drop 	off in the future iteration. </a:t>
-            </a:r>
-            <a:r>
-              <a:rPr lang="en-US" sz="1200" b="0" strike="noStrike" spc="-1" dirty="0">
+              <a:t>		decrease 0.1x to 0 will not infect y,z,t .Then 0.9x will be kept and drop 	off in the future iteration. </a:t>
+            </a:r>
+            <a:r>
+              <a:rPr lang="en-US" sz="1200" b="0" strike="noStrike" spc="-1">
                 <a:solidFill>
                   <a:srgbClr val="000000"/>
                 </a:solidFill>
@@ -19409,7 +19256,7 @@
               <a:t></a:t>
             </a:r>
             <a:r>
-              <a:rPr lang="en-US" sz="1200" b="0" strike="noStrike" spc="-1" dirty="0">
+              <a:rPr lang="en-US" sz="1200" b="0" strike="noStrike" spc="-1">
                 <a:solidFill>
                   <a:srgbClr val="000000"/>
                 </a:solidFill>
@@ -19419,7 +19266,7 @@
               <a:t> </a:t>
             </a:r>
             <a:r>
-              <a:rPr lang="en-US" sz="1200" b="1" strike="noStrike" spc="-1" dirty="0">
+              <a:rPr lang="en-US" sz="1200" b="1" strike="noStrike" spc="-1">
                 <a:solidFill>
                   <a:srgbClr val="000000"/>
                 </a:solidFill>
@@ -19428,7 +19275,7 @@
               </a:rPr>
               <a:t>property 1</a:t>
             </a:r>
-            <a:endParaRPr lang="en-US" sz="1200" b="0" strike="noStrike" spc="-1" dirty="0">
+            <a:endParaRPr lang="en-US" sz="1200" b="0" strike="noStrike" spc="-1">
               <a:solidFill>
                 <a:srgbClr val="000000"/>
               </a:solidFill>
@@ -19445,96 +19292,16 @@
               </a:spcBef>
             </a:pPr>
             <a:r>
-              <a:rPr lang="en-US" sz="1200" b="0" strike="noStrike" spc="-1" dirty="0">
+              <a:rPr lang="en-US" sz="1200" b="0" strike="noStrike" spc="-1">
                 <a:solidFill>
                   <a:srgbClr val="000000"/>
                 </a:solidFill>
                 <a:latin typeface="Arial"/>
                 <a:ea typeface="Arial"/>
               </a:rPr>
-              <a:t>	else(</a:t>
-            </a:r>
-            <a:r>
-              <a:rPr lang="en-US" sz="1200" b="0" strike="noStrike" spc="-1" dirty="0" err="1">
-                <a:solidFill>
-                  <a:srgbClr val="000000"/>
-                </a:solidFill>
-                <a:latin typeface="Arial"/>
-                <a:ea typeface="Arial"/>
-              </a:rPr>
-              <a:t>y.v</a:t>
-            </a:r>
-            <a:r>
-              <a:rPr lang="en-US" sz="1200" b="0" strike="noStrike" spc="-1" dirty="0">
-                <a:solidFill>
-                  <a:srgbClr val="000000"/>
-                </a:solidFill>
-                <a:latin typeface="Arial"/>
-                <a:ea typeface="Arial"/>
-              </a:rPr>
-              <a:t>&lt;</a:t>
-            </a:r>
-            <a:r>
-              <a:rPr lang="en-US" sz="1200" b="0" strike="noStrike" spc="-1" dirty="0" err="1">
-                <a:solidFill>
-                  <a:srgbClr val="000000"/>
-                </a:solidFill>
-                <a:latin typeface="Arial"/>
-                <a:ea typeface="Arial"/>
-              </a:rPr>
-              <a:t>z.v</a:t>
-            </a:r>
-            <a:r>
-              <a:rPr lang="en-US" sz="1200" b="0" strike="noStrike" spc="-1" dirty="0">
-                <a:solidFill>
-                  <a:srgbClr val="000000"/>
-                </a:solidFill>
-                <a:latin typeface="Arial"/>
-                <a:ea typeface="Arial"/>
-              </a:rPr>
-              <a:t>&lt;</a:t>
-            </a:r>
-            <a:r>
-              <a:rPr lang="en-US" sz="1200" b="0" strike="noStrike" spc="-1" dirty="0" err="1">
-                <a:solidFill>
-                  <a:srgbClr val="000000"/>
-                </a:solidFill>
-                <a:latin typeface="Arial"/>
-                <a:ea typeface="Arial"/>
-              </a:rPr>
-              <a:t>x.v</a:t>
-            </a:r>
-            <a:r>
-              <a:rPr lang="en-US" sz="1200" b="0" strike="noStrike" spc="-1" dirty="0">
-                <a:solidFill>
-                  <a:srgbClr val="000000"/>
-                </a:solidFill>
-                <a:latin typeface="Arial"/>
-                <a:ea typeface="Arial"/>
-              </a:rPr>
-              <a:t>&lt;</a:t>
-            </a:r>
-            <a:r>
-              <a:rPr lang="en-US" sz="1200" b="0" strike="noStrike" spc="-1" dirty="0" err="1">
-                <a:solidFill>
-                  <a:srgbClr val="000000"/>
-                </a:solidFill>
-                <a:latin typeface="Arial"/>
-                <a:ea typeface="Arial"/>
-              </a:rPr>
-              <a:t>t.v</a:t>
-            </a:r>
-            <a:r>
-              <a:rPr lang="en-US" sz="1200" b="0" strike="noStrike" spc="-1" dirty="0">
-                <a:solidFill>
-                  <a:srgbClr val="000000"/>
-                </a:solidFill>
-                <a:latin typeface="Arial"/>
-                <a:ea typeface="Arial"/>
-              </a:rPr>
-              <a:t>)</a:t>
-            </a:r>
-            <a:endParaRPr lang="en-US" sz="1200" b="0" strike="noStrike" spc="-1" dirty="0">
+              <a:t>	else(y.v&lt;z.v&lt;x.v&lt;t.v)</a:t>
+            </a:r>
+            <a:endParaRPr lang="en-US" sz="1200" b="0" strike="noStrike" spc="-1">
               <a:solidFill>
                 <a:srgbClr val="000000"/>
               </a:solidFill>
@@ -19551,7 +19318,7 @@
               </a:spcBef>
             </a:pPr>
             <a:r>
-              <a:rPr lang="en-US" sz="1200" b="0" strike="noStrike" spc="-1" dirty="0">
+              <a:rPr lang="en-US" sz="1200" b="0" strike="noStrike" spc="-1">
                 <a:solidFill>
                   <a:srgbClr val="000000"/>
                 </a:solidFill>
@@ -19561,7 +19328,7 @@
               <a:t>		decrease 0.1x to 0 will lead to 0.9x</a:t>
             </a:r>
             <a:r>
-              <a:rPr lang="en-US" sz="1200" b="0" strike="noStrike" spc="-1" dirty="0">
+              <a:rPr lang="en-US" sz="1200" b="0" strike="noStrike" spc="-1">
                 <a:solidFill>
                   <a:srgbClr val="000000"/>
                 </a:solidFill>
@@ -19571,7 +19338,7 @@
               <a:t></a:t>
             </a:r>
             <a:r>
-              <a:rPr lang="en-US" sz="1200" b="0" strike="noStrike" spc="-1" dirty="0">
+              <a:rPr lang="en-US" sz="1200" b="0" strike="noStrike" spc="-1">
                 <a:solidFill>
                   <a:srgbClr val="000000"/>
                 </a:solidFill>
@@ -19580,7 +19347,7 @@
               </a:rPr>
               <a:t>(0.9x+wx)</a:t>
             </a:r>
-            <a:endParaRPr lang="en-US" sz="1200" b="0" strike="noStrike" spc="-1" dirty="0">
+            <a:endParaRPr lang="en-US" sz="1200" b="0" strike="noStrike" spc="-1">
               <a:solidFill>
                 <a:srgbClr val="000000"/>
               </a:solidFill>
@@ -19597,7 +19364,7 @@
               </a:spcBef>
             </a:pPr>
             <a:r>
-              <a:rPr lang="en-US" sz="1200" b="0" strike="noStrike" spc="-1" dirty="0">
+              <a:rPr lang="en-US" sz="1200" b="0" strike="noStrike" spc="-1">
                 <a:solidFill>
                   <a:srgbClr val="000000"/>
                 </a:solidFill>
@@ -19607,7 +19374,7 @@
               <a:t>			First result: 0.9x</a:t>
             </a:r>
             <a:r>
-              <a:rPr lang="en-US" sz="1200" b="0" strike="noStrike" spc="-1" dirty="0">
+              <a:rPr lang="en-US" sz="1200" b="0" strike="noStrike" spc="-1">
                 <a:solidFill>
                   <a:srgbClr val="000000"/>
                 </a:solidFill>
@@ -19617,7 +19384,7 @@
               <a:t></a:t>
             </a:r>
             <a:r>
-              <a:rPr lang="en-US" sz="1200" b="0" strike="noStrike" spc="-1" dirty="0">
+              <a:rPr lang="en-US" sz="1200" b="0" strike="noStrike" spc="-1">
                 <a:solidFill>
                   <a:srgbClr val="000000"/>
                 </a:solidFill>
@@ -19627,7 +19394,7 @@
               <a:t> (0.9+0.1)x  </a:t>
             </a:r>
             <a:r>
-              <a:rPr lang="en-US" sz="1200" b="0" strike="noStrike" spc="-1" dirty="0">
+              <a:rPr lang="en-US" sz="1200" b="0" strike="noStrike" spc="-1">
                 <a:solidFill>
                   <a:srgbClr val="000000"/>
                 </a:solidFill>
@@ -19637,7 +19404,7 @@
               <a:t></a:t>
             </a:r>
             <a:r>
-              <a:rPr lang="en-US" sz="1200" b="1" strike="noStrike" spc="-1" dirty="0">
+              <a:rPr lang="en-US" sz="1200" b="1" strike="noStrike" spc="-1">
                 <a:solidFill>
                   <a:srgbClr val="000000"/>
                 </a:solidFill>
@@ -19646,7 +19413,7 @@
               </a:rPr>
               <a:t>property 2</a:t>
             </a:r>
-            <a:endParaRPr lang="en-US" sz="1200" b="0" strike="noStrike" spc="-1" dirty="0">
+            <a:endParaRPr lang="en-US" sz="1200" b="0" strike="noStrike" spc="-1">
               <a:solidFill>
                 <a:srgbClr val="000000"/>
               </a:solidFill>
@@ -19663,7 +19430,7 @@
               </a:spcBef>
             </a:pPr>
             <a:r>
-              <a:rPr lang="en-US" sz="1200" b="0" strike="noStrike" spc="-1" dirty="0">
+              <a:rPr lang="en-US" sz="1200" b="0" strike="noStrike" spc="-1">
                 <a:solidFill>
                   <a:srgbClr val="000000"/>
                 </a:solidFill>
@@ -19673,7 +19440,7 @@
               <a:t>			Second result: w&lt;0.1(after remove y and z on node1</a:t>
             </a:r>
             <a:r>
-              <a:rPr lang="en-US" sz="1200" b="0" strike="noStrike" spc="-1" dirty="0">
+              <a:rPr lang="en-US" sz="1200" b="0" strike="noStrike" spc="-1">
                 <a:solidFill>
                   <a:srgbClr val="000000"/>
                 </a:solidFill>
@@ -19682,7 +19449,7 @@
               </a:rPr>
               <a:t></a:t>
             </a:r>
-            <a:endParaRPr lang="en-US" sz="1200" b="0" strike="noStrike" spc="-1" dirty="0">
+            <a:endParaRPr lang="en-US" sz="1200" b="0" strike="noStrike" spc="-1">
               <a:solidFill>
                 <a:srgbClr val="000000"/>
               </a:solidFill>
@@ -19699,57 +19466,37 @@
               </a:spcBef>
             </a:pPr>
             <a:r>
-              <a:rPr lang="en-US" sz="1200" b="0" strike="noStrike" spc="-1" dirty="0">
+              <a:rPr lang="en-US" sz="1200" b="0" strike="noStrike" spc="-1">
                 <a:solidFill>
                   <a:srgbClr val="000000"/>
                 </a:solidFill>
                 <a:latin typeface="Arial"/>
                 <a:ea typeface="Arial"/>
               </a:rPr>
-              <a:t>				  </a:t>
-            </a:r>
-            <a:r>
-              <a:rPr lang="en-US" sz="1200" b="0" strike="noStrike" spc="-1" dirty="0" err="1">
+              <a:t>				  X.v = min{V</a:t>
+            </a:r>
+            <a:r>
+              <a:rPr lang="en-US" sz="1200" b="0" strike="noStrike" spc="-1" baseline="-25000">
                 <a:solidFill>
                   <a:srgbClr val="000000"/>
                 </a:solidFill>
                 <a:latin typeface="Arial"/>
                 <a:ea typeface="Arial"/>
               </a:rPr>
-              <a:t>X.v</a:t>
-            </a:r>
-            <a:r>
-              <a:rPr lang="en-US" sz="1200" b="0" strike="noStrike" spc="-1" dirty="0">
+              <a:t>n1</a:t>
+            </a:r>
+            <a:r>
+              <a:rPr lang="en-US" sz="1200" b="0" strike="noStrike" spc="-1">
                 <a:solidFill>
                   <a:srgbClr val="000000"/>
                 </a:solidFill>
                 <a:latin typeface="Arial"/>
                 <a:ea typeface="Arial"/>
               </a:rPr>
-              <a:t> = min{V</a:t>
-            </a:r>
-            <a:r>
-              <a:rPr lang="en-US" sz="1200" b="0" strike="noStrike" spc="-1" baseline="-25000" dirty="0">
-                <a:solidFill>
-                  <a:srgbClr val="000000"/>
-                </a:solidFill>
-                <a:latin typeface="Arial"/>
-                <a:ea typeface="Arial"/>
-              </a:rPr>
-              <a:t>n1</a:t>
-            </a:r>
-            <a:r>
-              <a:rPr lang="en-US" sz="1200" b="0" strike="noStrike" spc="-1" dirty="0">
-                <a:solidFill>
-                  <a:srgbClr val="000000"/>
-                </a:solidFill>
-                <a:latin typeface="Arial"/>
-                <a:ea typeface="Arial"/>
-              </a:rPr>
               <a:t>}) </a:t>
             </a:r>
             <a:r>
-              <a:rPr lang="en-US" sz="1200" b="0" strike="noStrike" spc="-1" dirty="0">
+              <a:rPr lang="en-US" sz="1200" b="0" strike="noStrike" spc="-1">
                 <a:solidFill>
                   <a:srgbClr val="000000"/>
                 </a:solidFill>
@@ -19759,7 +19506,7 @@
               <a:t></a:t>
             </a:r>
             <a:r>
-              <a:rPr lang="en-US" sz="1200" b="0" strike="noStrike" spc="-1" dirty="0">
+              <a:rPr lang="en-US" sz="1200" b="0" strike="noStrike" spc="-1">
                 <a:solidFill>
                   <a:srgbClr val="000000"/>
                 </a:solidFill>
@@ -19769,7 +19516,7 @@
               <a:t>(0.9x+wx)&lt;1</a:t>
             </a:r>
             <a:r>
-              <a:rPr lang="en-US" sz="1200" b="0" strike="noStrike" spc="-1" dirty="0">
+              <a:rPr lang="en-US" sz="1200" b="0" strike="noStrike" spc="-1">
                 <a:solidFill>
                   <a:srgbClr val="000000"/>
                 </a:solidFill>
@@ -19778,7 +19525,7 @@
               </a:rPr>
               <a:t></a:t>
             </a:r>
-            <a:endParaRPr lang="en-US" sz="1200" b="0" strike="noStrike" spc="-1" dirty="0">
+            <a:endParaRPr lang="en-US" sz="1200" b="0" strike="noStrike" spc="-1">
               <a:solidFill>
                 <a:srgbClr val="000000"/>
               </a:solidFill>
@@ -19795,27 +19542,17 @@
               </a:spcBef>
             </a:pPr>
             <a:r>
-              <a:rPr lang="en-US" sz="1200" b="0" strike="noStrike" spc="-1" dirty="0">
+              <a:rPr lang="en-US" sz="1200" b="0" strike="noStrike" spc="-1">
                 <a:solidFill>
                   <a:srgbClr val="000000"/>
                 </a:solidFill>
                 <a:latin typeface="Arial"/>
                 <a:ea typeface="Arial"/>
               </a:rPr>
-              <a:t>				  drop </a:t>
-            </a:r>
-            <a:r>
-              <a:rPr lang="en-US" sz="1200" b="0" strike="noStrike" spc="-1" dirty="0" err="1">
-                <a:solidFill>
-                  <a:srgbClr val="000000"/>
-                </a:solidFill>
-                <a:latin typeface="Arial"/>
-                <a:ea typeface="Arial"/>
-              </a:rPr>
-              <a:t>off</a:t>
-            </a:r>
-            <a:r>
-              <a:rPr lang="en-US" sz="1200" b="0" strike="noStrike" spc="-1" dirty="0" err="1">
+              <a:t>				  drop off</a:t>
+            </a:r>
+            <a:r>
+              <a:rPr lang="en-US" sz="1200" b="0" strike="noStrike" spc="-1">
                 <a:solidFill>
                   <a:srgbClr val="000000"/>
                 </a:solidFill>
@@ -19825,26 +19562,16 @@
               <a:t></a:t>
             </a:r>
             <a:r>
-              <a:rPr lang="en-US" sz="1200" b="1" strike="noStrike" spc="-1" dirty="0" err="1">
+              <a:rPr lang="en-US" sz="1200" b="1" strike="noStrike" spc="-1">
                 <a:solidFill>
                   <a:srgbClr val="000000"/>
                 </a:solidFill>
                 <a:latin typeface="Arial"/>
                 <a:ea typeface="Arial"/>
               </a:rPr>
-              <a:t>property</a:t>
-            </a:r>
-            <a:r>
-              <a:rPr lang="en-US" sz="1200" b="1" strike="noStrike" spc="-1" dirty="0">
-                <a:solidFill>
-                  <a:srgbClr val="000000"/>
-                </a:solidFill>
-                <a:latin typeface="Arial"/>
-                <a:ea typeface="Arial"/>
-              </a:rPr>
-              <a:t> 1</a:t>
-            </a:r>
-            <a:endParaRPr lang="en-US" sz="1200" b="0" strike="noStrike" spc="-1" dirty="0">
+              <a:t>property 1</a:t>
+            </a:r>
+            <a:endParaRPr lang="en-US" sz="1200" b="0" strike="noStrike" spc="-1">
               <a:solidFill>
                 <a:srgbClr val="000000"/>
               </a:solidFill>
@@ -19860,7 +19587,7 @@
                 <a:spcPts val="799"/>
               </a:spcBef>
             </a:pPr>
-            <a:endParaRPr lang="en-US" sz="1200" b="0" strike="noStrike" spc="-1" dirty="0">
+            <a:endParaRPr lang="en-US" sz="1200" b="0" strike="noStrike" spc="-1">
               <a:solidFill>
                 <a:srgbClr val="000000"/>
               </a:solidFill>
@@ -19876,7 +19603,7 @@
                 <a:spcPts val="799"/>
               </a:spcBef>
             </a:pPr>
-            <a:endParaRPr lang="en-US" sz="1200" b="0" strike="noStrike" spc="-1" dirty="0">
+            <a:endParaRPr lang="en-US" sz="1200" b="0" strike="noStrike" spc="-1">
               <a:solidFill>
                 <a:srgbClr val="000000"/>
               </a:solidFill>
@@ -20016,14 +19743,13 @@
           <p:cNvPicPr/>
           <p:nvPr/>
         </p:nvPicPr>
-        <p:blipFill rotWithShape="1">
+        <p:blipFill>
           <a:blip r:embed="rId2"/>
-          <a:srcRect l="5" t="3059" r="-5" b="-3059"/>
           <a:stretch/>
         </p:blipFill>
         <p:spPr>
           <a:xfrm>
-            <a:off x="1151556" y="3937765"/>
+            <a:off x="1201320" y="4155480"/>
             <a:ext cx="3809520" cy="2567160"/>
           </a:xfrm>
           <a:prstGeom prst="rect">
@@ -20152,59 +19878,6 @@
           </a:prstGeom>
         </p:spPr>
       </p:pic>
-      <p:sp>
-        <p:nvSpPr>
-          <p:cNvPr id="6" name="TextShape 1">
-            <a:extLst>
-              <a:ext uri="{FF2B5EF4-FFF2-40B4-BE49-F238E27FC236}">
-                <a16:creationId xmlns:a16="http://schemas.microsoft.com/office/drawing/2014/main" id="{ED00E13E-A982-4E6F-96EA-3184331A6C97}"/>
-              </a:ext>
-            </a:extLst>
-          </p:cNvPr>
-          <p:cNvSpPr txBox="1"/>
-          <p:nvPr/>
-        </p:nvSpPr>
-        <p:spPr>
-          <a:xfrm>
-            <a:off x="581505" y="1446861"/>
-            <a:ext cx="7374600" cy="4174200"/>
-          </a:xfrm>
-          <a:prstGeom prst="rect">
-            <a:avLst/>
-          </a:prstGeom>
-          <a:noFill/>
-          <a:ln>
-            <a:noFill/>
-          </a:ln>
-        </p:spPr>
-        <p:txBody>
-          <a:bodyPr tIns="91440" bIns="91440"/>
-          <a:lstStyle/>
-          <a:p>
-            <a:pPr marL="609480" indent="-304560">
-              <a:lnSpc>
-                <a:spcPct val="100000"/>
-              </a:lnSpc>
-            </a:pPr>
-            <a:r>
-              <a:rPr lang="en-US" sz="2670" b="0" strike="noStrike" spc="-1" dirty="0">
-                <a:solidFill>
-                  <a:srgbClr val="000000"/>
-                </a:solidFill>
-                <a:latin typeface="Arial"/>
-                <a:ea typeface="Arial"/>
-              </a:rPr>
-              <a:t>Experiments</a:t>
-            </a:r>
-            <a:endParaRPr lang="en-US" sz="2670" b="0" strike="noStrike" spc="-1" dirty="0">
-              <a:solidFill>
-                <a:srgbClr val="000000"/>
-              </a:solidFill>
-              <a:latin typeface="Arial"/>
-            </a:endParaRPr>
-          </a:p>
-        </p:txBody>
-      </p:sp>
     </p:spTree>
     <p:extLst>
       <p:ext uri="{BB962C8B-B14F-4D97-AF65-F5344CB8AC3E}">
@@ -20446,74 +20119,382 @@
       </p:grpSpPr>
       <p:sp>
         <p:nvSpPr>
-          <p:cNvPr id="3" name="Subtitle 2">
-            <a:extLst>
-              <a:ext uri="{FF2B5EF4-FFF2-40B4-BE49-F238E27FC236}">
-                <a16:creationId xmlns:a16="http://schemas.microsoft.com/office/drawing/2014/main" id="{3298F883-3DDD-4EFC-89DA-12C439C302D2}"/>
-              </a:ext>
-            </a:extLst>
-          </p:cNvPr>
-          <p:cNvSpPr>
-            <a:spLocks noGrp="1"/>
-          </p:cNvSpPr>
-          <p:nvPr>
-            <p:ph type="subTitle"/>
-          </p:nvPr>
-        </p:nvSpPr>
-        <p:spPr>
-          <a:xfrm>
-            <a:off x="1228717" y="-46722"/>
-            <a:ext cx="5081040" cy="4174200"/>
-          </a:xfrm>
-        </p:spPr>
-        <p:txBody>
-          <a:bodyPr/>
-          <a:lstStyle/>
-          <a:p>
-            <a:r>
-              <a:rPr lang="en-US" altLang="zh-CN" dirty="0"/>
-              <a:t>500 users</a:t>
-            </a:r>
-            <a:endParaRPr lang="en-US" dirty="0"/>
-          </a:p>
-        </p:txBody>
-      </p:sp>
-      <p:pic>
-        <p:nvPicPr>
-          <p:cNvPr id="4" name="Picture 3">
-            <a:extLst>
-              <a:ext uri="{FF2B5EF4-FFF2-40B4-BE49-F238E27FC236}">
-                <a16:creationId xmlns:a16="http://schemas.microsoft.com/office/drawing/2014/main" id="{7FC1134E-793E-448C-BCD0-C37D4BF4594D}"/>
-              </a:ext>
-            </a:extLst>
-          </p:cNvPr>
-          <p:cNvPicPr>
-            <a:picLocks noChangeAspect="1"/>
-          </p:cNvPicPr>
+          <p:cNvPr id="292" name="TextShape 1"/>
+          <p:cNvSpPr txBox="1"/>
           <p:nvPr/>
-        </p:nvPicPr>
-        <p:blipFill>
-          <a:blip r:embed="rId2"/>
-          <a:stretch>
-            <a:fillRect/>
-          </a:stretch>
-        </p:blipFill>
-        <p:spPr>
-          <a:xfrm>
-            <a:off x="4141064" y="1986102"/>
-            <a:ext cx="5998201" cy="4282751"/>
-          </a:xfrm>
-          <a:prstGeom prst="rect">
-            <a:avLst/>
-          </a:prstGeom>
-        </p:spPr>
-      </p:pic>
+        </p:nvSpPr>
+        <p:spPr>
+          <a:xfrm>
+            <a:off x="580680" y="1341720"/>
+            <a:ext cx="9651240" cy="5172120"/>
+          </a:xfrm>
+          <a:prstGeom prst="rect">
+            <a:avLst/>
+          </a:prstGeom>
+          <a:noFill/>
+          <a:ln>
+            <a:noFill/>
+          </a:ln>
+        </p:spPr>
+        <p:txBody>
+          <a:bodyPr tIns="91440" bIns="91440"/>
+          <a:lstStyle/>
+          <a:p>
+            <a:pPr marL="609480" indent="-304560">
+              <a:lnSpc>
+                <a:spcPct val="100000"/>
+              </a:lnSpc>
+            </a:pPr>
+            <a:r>
+              <a:rPr lang="en-US" sz="2670" b="0" strike="noStrike" spc="-1" dirty="0">
+                <a:solidFill>
+                  <a:srgbClr val="000000"/>
+                </a:solidFill>
+                <a:latin typeface="Arial"/>
+                <a:ea typeface="Arial"/>
+              </a:rPr>
+              <a:t>Summary</a:t>
+            </a:r>
+            <a:endParaRPr lang="en-US" sz="2670" b="0" strike="noStrike" spc="-1" dirty="0">
+              <a:solidFill>
+                <a:srgbClr val="000000"/>
+              </a:solidFill>
+              <a:latin typeface="Arial"/>
+            </a:endParaRPr>
+          </a:p>
+          <a:p>
+            <a:pPr marL="609480" indent="-304560">
+              <a:lnSpc>
+                <a:spcPct val="100000"/>
+              </a:lnSpc>
+            </a:pPr>
+            <a:endParaRPr lang="en-US" sz="2670" b="0" strike="noStrike" spc="-1" dirty="0">
+              <a:solidFill>
+                <a:srgbClr val="000000"/>
+              </a:solidFill>
+              <a:latin typeface="Arial"/>
+            </a:endParaRPr>
+          </a:p>
+          <a:p>
+            <a:pPr marL="609480" indent="-304560">
+              <a:lnSpc>
+                <a:spcPct val="100000"/>
+              </a:lnSpc>
+            </a:pPr>
+            <a:r>
+              <a:rPr lang="en-US" sz="2670" b="0" strike="noStrike" spc="-1" dirty="0">
+                <a:solidFill>
+                  <a:srgbClr val="000000"/>
+                </a:solidFill>
+                <a:latin typeface="Arial"/>
+                <a:ea typeface="Arial"/>
+              </a:rPr>
+              <a:t>Pros:</a:t>
+            </a:r>
+            <a:endParaRPr lang="en-US" sz="2670" b="0" strike="noStrike" spc="-1" dirty="0">
+              <a:solidFill>
+                <a:srgbClr val="000000"/>
+              </a:solidFill>
+              <a:latin typeface="Arial"/>
+            </a:endParaRPr>
+          </a:p>
+          <a:p>
+            <a:pPr marL="1219320" lvl="1" indent="-423000">
+              <a:lnSpc>
+                <a:spcPct val="100000"/>
+              </a:lnSpc>
+              <a:buClr>
+                <a:srgbClr val="000000"/>
+              </a:buClr>
+              <a:buFont typeface="Arial"/>
+              <a:buChar char="•"/>
+            </a:pPr>
+            <a:r>
+              <a:rPr lang="en-US" sz="1870" b="0" strike="noStrike" spc="-1" dirty="0">
+                <a:solidFill>
+                  <a:srgbClr val="000000"/>
+                </a:solidFill>
+                <a:latin typeface="Arial"/>
+                <a:ea typeface="Arial"/>
+              </a:rPr>
+              <a:t>Achieve good approximation for mixed integer programming with much less computation.</a:t>
+            </a:r>
+          </a:p>
+          <a:p>
+            <a:pPr marL="1219320" lvl="1" indent="-423000">
+              <a:lnSpc>
+                <a:spcPct val="100000"/>
+              </a:lnSpc>
+              <a:buClr>
+                <a:srgbClr val="000000"/>
+              </a:buClr>
+              <a:buFont typeface="Arial"/>
+              <a:buChar char="•"/>
+            </a:pPr>
+            <a:endParaRPr lang="en-US" sz="1870" b="0" strike="noStrike" spc="-1" dirty="0">
+              <a:solidFill>
+                <a:srgbClr val="000000"/>
+              </a:solidFill>
+              <a:latin typeface="Arial"/>
+              <a:ea typeface="Arial"/>
+            </a:endParaRPr>
+          </a:p>
+          <a:p>
+            <a:pPr marL="1219320" lvl="1" indent="-423000">
+              <a:buClr>
+                <a:srgbClr val="000000"/>
+              </a:buClr>
+              <a:buFont typeface="Arial"/>
+              <a:buChar char="•"/>
+            </a:pPr>
+            <a:r>
+              <a:rPr lang="en-US" sz="2000" dirty="0"/>
+              <a:t>Used less memory for computation compared with the original MIP</a:t>
+            </a:r>
+            <a:endParaRPr lang="en-US" sz="1870" b="0" strike="noStrike" spc="-1" dirty="0">
+              <a:solidFill>
+                <a:srgbClr val="000000"/>
+              </a:solidFill>
+              <a:latin typeface="Arial"/>
+            </a:endParaRPr>
+          </a:p>
+          <a:p>
+            <a:endParaRPr lang="en-US" sz="1870" b="0" strike="noStrike" spc="-1" dirty="0">
+              <a:solidFill>
+                <a:srgbClr val="000000"/>
+              </a:solidFill>
+              <a:latin typeface="Arial"/>
+            </a:endParaRPr>
+          </a:p>
+          <a:p>
+            <a:pPr marL="1219320" lvl="1" indent="-423000">
+              <a:lnSpc>
+                <a:spcPct val="100000"/>
+              </a:lnSpc>
+              <a:buClr>
+                <a:srgbClr val="000000"/>
+              </a:buClr>
+              <a:buFont typeface="Arial"/>
+              <a:buChar char="•"/>
+            </a:pPr>
+            <a:r>
+              <a:rPr lang="en-US" sz="1870" b="0" strike="noStrike" spc="-1" dirty="0">
+                <a:solidFill>
+                  <a:srgbClr val="000000"/>
+                </a:solidFill>
+                <a:latin typeface="Arial"/>
+                <a:ea typeface="Arial"/>
+              </a:rPr>
+              <a:t>Solution duration is much more stable than </a:t>
+            </a:r>
+            <a:r>
+              <a:rPr lang="en-US" sz="1870" b="0" strike="noStrike" spc="-1" dirty="0" err="1">
+                <a:solidFill>
+                  <a:srgbClr val="000000"/>
+                </a:solidFill>
+                <a:latin typeface="Arial"/>
+                <a:ea typeface="Arial"/>
+              </a:rPr>
+              <a:t>mip’s</a:t>
+            </a:r>
+            <a:r>
+              <a:rPr lang="en-US" sz="1870" b="0" strike="noStrike" spc="-1" dirty="0">
+                <a:solidFill>
+                  <a:srgbClr val="000000"/>
+                </a:solidFill>
+                <a:latin typeface="Arial"/>
+                <a:ea typeface="Arial"/>
+              </a:rPr>
+              <a:t>.</a:t>
+            </a:r>
+            <a:endParaRPr lang="en-US" sz="1870" b="0" strike="noStrike" spc="-1" dirty="0">
+              <a:solidFill>
+                <a:srgbClr val="000000"/>
+              </a:solidFill>
+              <a:latin typeface="Arial"/>
+            </a:endParaRPr>
+          </a:p>
+          <a:p>
+            <a:endParaRPr lang="en-US" sz="1870" b="0" strike="noStrike" spc="-1" dirty="0">
+              <a:solidFill>
+                <a:srgbClr val="000000"/>
+              </a:solidFill>
+              <a:latin typeface="Arial"/>
+            </a:endParaRPr>
+          </a:p>
+          <a:p>
+            <a:pPr marL="1219320" lvl="1" indent="-423000">
+              <a:lnSpc>
+                <a:spcPct val="100000"/>
+              </a:lnSpc>
+              <a:buClr>
+                <a:srgbClr val="000000"/>
+              </a:buClr>
+              <a:buFont typeface="Arial"/>
+              <a:buChar char="•"/>
+            </a:pPr>
+            <a:r>
+              <a:rPr lang="en-US" sz="1870" b="0" strike="noStrike" spc="-1" dirty="0">
+                <a:solidFill>
+                  <a:srgbClr val="000000"/>
+                </a:solidFill>
+                <a:latin typeface="Arial"/>
+                <a:ea typeface="Arial"/>
+              </a:rPr>
+              <a:t>Adjustable(parameters, terminate condition)</a:t>
+            </a:r>
+            <a:endParaRPr lang="en-US" sz="1870" b="0" strike="noStrike" spc="-1" dirty="0">
+              <a:solidFill>
+                <a:srgbClr val="000000"/>
+              </a:solidFill>
+              <a:latin typeface="Arial"/>
+            </a:endParaRPr>
+          </a:p>
+          <a:p>
+            <a:pPr marL="609480" indent="-304560">
+              <a:lnSpc>
+                <a:spcPct val="100000"/>
+              </a:lnSpc>
+            </a:pPr>
+            <a:r>
+              <a:rPr lang="en-US" sz="2670" b="0" strike="noStrike" spc="-1" dirty="0">
+                <a:solidFill>
+                  <a:srgbClr val="000000"/>
+                </a:solidFill>
+                <a:latin typeface="Arial"/>
+                <a:ea typeface="Arial"/>
+              </a:rPr>
+              <a:t>Cons:</a:t>
+            </a:r>
+            <a:endParaRPr lang="en-US" sz="2670" b="0" strike="noStrike" spc="-1" dirty="0">
+              <a:solidFill>
+                <a:srgbClr val="000000"/>
+              </a:solidFill>
+              <a:latin typeface="Arial"/>
+            </a:endParaRPr>
+          </a:p>
+          <a:p>
+            <a:pPr marL="1219320" lvl="1" indent="-423000">
+              <a:lnSpc>
+                <a:spcPct val="100000"/>
+              </a:lnSpc>
+              <a:buClr>
+                <a:srgbClr val="000000"/>
+              </a:buClr>
+              <a:buFont typeface="Arial"/>
+              <a:buChar char="•"/>
+            </a:pPr>
+            <a:r>
+              <a:rPr lang="en-US" sz="1870" b="0" strike="noStrike" spc="-1" dirty="0">
+                <a:solidFill>
+                  <a:srgbClr val="000000"/>
+                </a:solidFill>
+                <a:latin typeface="Arial"/>
+                <a:ea typeface="Arial"/>
+              </a:rPr>
+              <a:t>Still mixed integer programming in each iteration(LP in future work)</a:t>
+            </a:r>
+            <a:endParaRPr lang="en-US" sz="1870" b="0" strike="noStrike" spc="-1" dirty="0">
+              <a:solidFill>
+                <a:srgbClr val="000000"/>
+              </a:solidFill>
+              <a:latin typeface="Arial"/>
+            </a:endParaRPr>
+          </a:p>
+        </p:txBody>
+      </p:sp>
+      <p:sp>
+        <p:nvSpPr>
+          <p:cNvPr id="293" name="TextShape 2"/>
+          <p:cNvSpPr txBox="1"/>
+          <p:nvPr/>
+        </p:nvSpPr>
+        <p:spPr>
+          <a:xfrm>
+            <a:off x="8235720" y="305280"/>
+            <a:ext cx="3654000" cy="353160"/>
+          </a:xfrm>
+          <a:prstGeom prst="rect">
+            <a:avLst/>
+          </a:prstGeom>
+          <a:noFill/>
+          <a:ln>
+            <a:noFill/>
+          </a:ln>
+        </p:spPr>
+        <p:txBody>
+          <a:bodyPr tIns="91440" bIns="91440"/>
+          <a:lstStyle/>
+          <a:p>
+            <a:pPr marL="609480" indent="-304560" algn="r">
+              <a:lnSpc>
+                <a:spcPct val="100000"/>
+              </a:lnSpc>
+            </a:pPr>
+            <a:r>
+              <a:rPr lang="en-US" sz="1870" b="0" strike="noStrike" spc="-1">
+                <a:solidFill>
+                  <a:srgbClr val="FFFFFF"/>
+                </a:solidFill>
+                <a:latin typeface="Arial"/>
+                <a:ea typeface="Arial"/>
+              </a:rPr>
+              <a:t>Heuristic 2</a:t>
+            </a:r>
+            <a:endParaRPr lang="en-US" sz="1870" b="0" strike="noStrike" spc="-1">
+              <a:solidFill>
+                <a:srgbClr val="000000"/>
+              </a:solidFill>
+              <a:latin typeface="Arial"/>
+            </a:endParaRPr>
+          </a:p>
+        </p:txBody>
+      </p:sp>
+      <p:sp>
+        <p:nvSpPr>
+          <p:cNvPr id="294" name="TextShape 3"/>
+          <p:cNvSpPr txBox="1"/>
+          <p:nvPr/>
+        </p:nvSpPr>
+        <p:spPr>
+          <a:xfrm>
+            <a:off x="8737560" y="6356520"/>
+            <a:ext cx="2844360" cy="365760"/>
+          </a:xfrm>
+          <a:prstGeom prst="rect">
+            <a:avLst/>
+          </a:prstGeom>
+          <a:noFill/>
+          <a:ln>
+            <a:noFill/>
+          </a:ln>
+        </p:spPr>
+        <p:txBody>
+          <a:bodyPr anchor="ctr"/>
+          <a:lstStyle/>
+          <a:p>
+            <a:pPr algn="r">
+              <a:lnSpc>
+                <a:spcPct val="100000"/>
+              </a:lnSpc>
+            </a:pPr>
+            <a:fld id="{61DC2E03-FD68-486D-AE98-2C8D0C3D7A76}" type="slidenum">
+              <a:rPr lang="en-US" sz="1600" b="0" strike="noStrike" spc="-1">
+                <a:solidFill>
+                  <a:srgbClr val="898989"/>
+                </a:solidFill>
+                <a:latin typeface="Arial"/>
+                <a:ea typeface="Arial"/>
+              </a:rPr>
+              <a:t>23</a:t>
+            </a:fld>
+            <a:endParaRPr lang="en-US" sz="1600" b="0" strike="noStrike" spc="-1">
+              <a:latin typeface="Times New Roman"/>
+            </a:endParaRPr>
+          </a:p>
+        </p:txBody>
+      </p:sp>
     </p:spTree>
-    <p:extLst>
-      <p:ext uri="{BB962C8B-B14F-4D97-AF65-F5344CB8AC3E}">
-        <p14:creationId xmlns:p14="http://schemas.microsoft.com/office/powerpoint/2010/main" val="549326311"/>
-      </p:ext>
-    </p:extLst>
   </p:cSld>
   <p:clrMapOvr>
     <a:masterClrMapping/>
@@ -20540,14 +20521,14 @@
       </p:grpSpPr>
       <p:sp>
         <p:nvSpPr>
-          <p:cNvPr id="292" name="TextShape 1"/>
+          <p:cNvPr id="295" name="TextShape 1"/>
           <p:cNvSpPr txBox="1"/>
           <p:nvPr/>
         </p:nvSpPr>
         <p:spPr>
           <a:xfrm>
-            <a:off x="580680" y="1341720"/>
-            <a:ext cx="9651240" cy="5172120"/>
+            <a:off x="3252240" y="2547720"/>
+            <a:ext cx="5081040" cy="4174200"/>
           </a:xfrm>
           <a:prstGeom prst="rect">
             <a:avLst/>
@@ -20561,20 +20542,20 @@
           <a:bodyPr tIns="91440" bIns="91440"/>
           <a:lstStyle/>
           <a:p>
-            <a:pPr marL="609480" indent="-304560">
-              <a:lnSpc>
-                <a:spcPct val="100000"/>
-              </a:lnSpc>
-            </a:pPr>
-            <a:r>
-              <a:rPr lang="en-US" sz="2670" b="0" strike="noStrike" spc="-1" dirty="0">
+            <a:pPr marL="609480" indent="-304560" algn="ctr">
+              <a:lnSpc>
+                <a:spcPct val="100000"/>
+              </a:lnSpc>
+            </a:pPr>
+            <a:r>
+              <a:rPr lang="en-US" sz="2670" b="1" strike="noStrike" spc="-1" dirty="0">
                 <a:solidFill>
                   <a:srgbClr val="000000"/>
                 </a:solidFill>
                 <a:latin typeface="Arial"/>
                 <a:ea typeface="Arial"/>
               </a:rPr>
-              <a:t>Summary</a:t>
+              <a:t>Thank you!</a:t>
             </a:r>
             <a:endParaRPr lang="en-US" sz="2670" b="0" strike="noStrike" spc="-1" dirty="0">
               <a:solidFill>
@@ -20584,11 +20565,47 @@
             </a:endParaRPr>
           </a:p>
           <a:p>
-            <a:pPr marL="609480" indent="-304560">
-              <a:lnSpc>
-                <a:spcPct val="100000"/>
-              </a:lnSpc>
-            </a:pPr>
+            <a:pPr marL="609480" indent="-304560" algn="ctr">
+              <a:lnSpc>
+                <a:spcPct val="100000"/>
+              </a:lnSpc>
+            </a:pPr>
+            <a:endParaRPr lang="en-US" sz="2670" b="0" strike="noStrike" spc="-1">
+              <a:solidFill>
+                <a:srgbClr val="000000"/>
+              </a:solidFill>
+              <a:latin typeface="Arial"/>
+            </a:endParaRPr>
+          </a:p>
+          <a:p>
+            <a:pPr marL="609480" indent="-304560" algn="ctr">
+              <a:lnSpc>
+                <a:spcPct val="100000"/>
+              </a:lnSpc>
+            </a:pPr>
+            <a:endParaRPr lang="en-US" sz="2670" b="0" strike="noStrike" spc="-1">
+              <a:solidFill>
+                <a:srgbClr val="000000"/>
+              </a:solidFill>
+              <a:latin typeface="Arial"/>
+            </a:endParaRPr>
+          </a:p>
+          <a:p>
+            <a:pPr marL="609480" indent="-304560" algn="ctr">
+              <a:lnSpc>
+                <a:spcPct val="100000"/>
+              </a:lnSpc>
+            </a:pPr>
+            <a:r>
+              <a:rPr lang="en-US" sz="2670" b="1" strike="noStrike" spc="-1" dirty="0">
+                <a:solidFill>
+                  <a:srgbClr val="000000"/>
+                </a:solidFill>
+                <a:latin typeface="Arial"/>
+                <a:ea typeface="Arial"/>
+              </a:rPr>
+              <a:t>Q&amp;A</a:t>
+            </a:r>
             <a:endParaRPr lang="en-US" sz="2670" b="0" strike="noStrike" spc="-1" dirty="0">
               <a:solidFill>
                 <a:srgbClr val="000000"/>
@@ -20596,244 +20613,18 @@
               <a:latin typeface="Arial"/>
             </a:endParaRPr>
           </a:p>
-          <a:p>
-            <a:pPr marL="609480" indent="-304560">
-              <a:lnSpc>
-                <a:spcPct val="100000"/>
-              </a:lnSpc>
-            </a:pPr>
-            <a:r>
-              <a:rPr lang="en-US" sz="2670" b="0" strike="noStrike" spc="-1" dirty="0">
-                <a:solidFill>
-                  <a:srgbClr val="000000"/>
-                </a:solidFill>
-                <a:latin typeface="Arial"/>
-                <a:ea typeface="Arial"/>
-              </a:rPr>
-              <a:t>Pros:</a:t>
-            </a:r>
-            <a:endParaRPr lang="en-US" sz="2670" b="0" strike="noStrike" spc="-1" dirty="0">
-              <a:solidFill>
-                <a:srgbClr val="000000"/>
-              </a:solidFill>
-              <a:latin typeface="Arial"/>
-            </a:endParaRPr>
-          </a:p>
-          <a:p>
-            <a:pPr marL="1219320" lvl="1" indent="-423000">
-              <a:lnSpc>
-                <a:spcPct val="100000"/>
-              </a:lnSpc>
-              <a:buClr>
-                <a:srgbClr val="000000"/>
-              </a:buClr>
-              <a:buFont typeface="Arial"/>
-              <a:buChar char="•"/>
-            </a:pPr>
-            <a:r>
-              <a:rPr lang="en-US" sz="1870" b="0" strike="noStrike" spc="-1" dirty="0">
-                <a:solidFill>
-                  <a:srgbClr val="000000"/>
-                </a:solidFill>
-                <a:latin typeface="Arial"/>
-                <a:ea typeface="Arial"/>
-              </a:rPr>
-              <a:t>Achieve good approximation(5% loss) for mixed integer programming with much less computation.</a:t>
-            </a:r>
-          </a:p>
-          <a:p>
-            <a:pPr marL="1219320" lvl="1" indent="-423000">
-              <a:lnSpc>
-                <a:spcPct val="100000"/>
-              </a:lnSpc>
-              <a:buClr>
-                <a:srgbClr val="000000"/>
-              </a:buClr>
-              <a:buFont typeface="Arial"/>
-              <a:buChar char="•"/>
-            </a:pPr>
-            <a:endParaRPr lang="en-US" sz="1870" b="0" strike="noStrike" spc="-1" dirty="0">
-              <a:solidFill>
-                <a:srgbClr val="000000"/>
-              </a:solidFill>
-              <a:latin typeface="Arial"/>
-              <a:ea typeface="Arial"/>
-            </a:endParaRPr>
-          </a:p>
-          <a:p>
-            <a:pPr marL="1219320" lvl="1" indent="-423000">
-              <a:buClr>
-                <a:srgbClr val="000000"/>
-              </a:buClr>
-              <a:buFont typeface="Arial"/>
-              <a:buChar char="•"/>
-            </a:pPr>
-            <a:r>
-              <a:rPr lang="en-US" sz="2000" dirty="0"/>
-              <a:t>Used less memory for computation compared with the original MIP</a:t>
-            </a:r>
-            <a:endParaRPr lang="en-US" sz="1870" b="0" strike="noStrike" spc="-1" dirty="0">
-              <a:solidFill>
-                <a:srgbClr val="000000"/>
-              </a:solidFill>
-              <a:latin typeface="Arial"/>
-            </a:endParaRPr>
-          </a:p>
-          <a:p>
-            <a:endParaRPr lang="en-US" sz="1870" b="0" strike="noStrike" spc="-1" dirty="0">
-              <a:solidFill>
-                <a:srgbClr val="000000"/>
-              </a:solidFill>
-              <a:latin typeface="Arial"/>
-            </a:endParaRPr>
-          </a:p>
-          <a:p>
-            <a:pPr marL="1219320" lvl="1" indent="-423000">
-              <a:lnSpc>
-                <a:spcPct val="100000"/>
-              </a:lnSpc>
-              <a:buClr>
-                <a:srgbClr val="000000"/>
-              </a:buClr>
-              <a:buFont typeface="Arial"/>
-              <a:buChar char="•"/>
-            </a:pPr>
-            <a:r>
-              <a:rPr lang="en-US" sz="1870" b="0" strike="noStrike" spc="-1" dirty="0">
-                <a:solidFill>
-                  <a:srgbClr val="000000"/>
-                </a:solidFill>
-                <a:latin typeface="Arial"/>
-                <a:ea typeface="Arial"/>
-              </a:rPr>
-              <a:t>Solution duration is much more stable than </a:t>
-            </a:r>
-            <a:r>
-              <a:rPr lang="en-US" sz="1870" b="0" strike="noStrike" spc="-1" dirty="0" err="1">
-                <a:solidFill>
-                  <a:srgbClr val="000000"/>
-                </a:solidFill>
-                <a:latin typeface="Arial"/>
-                <a:ea typeface="Arial"/>
-              </a:rPr>
-              <a:t>mip’s</a:t>
-            </a:r>
-            <a:r>
-              <a:rPr lang="en-US" sz="1870" b="0" strike="noStrike" spc="-1" dirty="0">
-                <a:solidFill>
-                  <a:srgbClr val="000000"/>
-                </a:solidFill>
-                <a:latin typeface="Arial"/>
-                <a:ea typeface="Arial"/>
-              </a:rPr>
-              <a:t>.</a:t>
-            </a:r>
-            <a:endParaRPr lang="en-US" sz="1870" b="0" strike="noStrike" spc="-1" dirty="0">
-              <a:solidFill>
-                <a:srgbClr val="000000"/>
-              </a:solidFill>
-              <a:latin typeface="Arial"/>
-            </a:endParaRPr>
-          </a:p>
-          <a:p>
-            <a:endParaRPr lang="en-US" sz="1870" b="0" strike="noStrike" spc="-1" dirty="0">
-              <a:solidFill>
-                <a:srgbClr val="000000"/>
-              </a:solidFill>
-              <a:latin typeface="Arial"/>
-            </a:endParaRPr>
-          </a:p>
-          <a:p>
-            <a:pPr marL="1219320" lvl="1" indent="-423000">
-              <a:lnSpc>
-                <a:spcPct val="100000"/>
-              </a:lnSpc>
-              <a:buClr>
-                <a:srgbClr val="000000"/>
-              </a:buClr>
-              <a:buFont typeface="Arial"/>
-              <a:buChar char="•"/>
-            </a:pPr>
-            <a:r>
-              <a:rPr lang="en-US" sz="1870" b="0" strike="noStrike" spc="-1" dirty="0">
-                <a:solidFill>
-                  <a:srgbClr val="000000"/>
-                </a:solidFill>
-                <a:latin typeface="Arial"/>
-                <a:ea typeface="Arial"/>
-              </a:rPr>
-              <a:t>Adjustable(parameters, terminate condition)</a:t>
-            </a:r>
-            <a:endParaRPr lang="en-US" sz="1870" b="0" strike="noStrike" spc="-1" dirty="0">
-              <a:solidFill>
-                <a:srgbClr val="000000"/>
-              </a:solidFill>
-              <a:latin typeface="Arial"/>
-            </a:endParaRPr>
-          </a:p>
-          <a:p>
-            <a:pPr marL="609480" indent="-304560">
-              <a:lnSpc>
-                <a:spcPct val="100000"/>
-              </a:lnSpc>
-            </a:pPr>
-            <a:r>
-              <a:rPr lang="en-US" sz="2670" b="0" strike="noStrike" spc="-1" dirty="0">
-                <a:solidFill>
-                  <a:srgbClr val="000000"/>
-                </a:solidFill>
-                <a:latin typeface="Arial"/>
-                <a:ea typeface="Arial"/>
-              </a:rPr>
-              <a:t>Cons:</a:t>
-            </a:r>
-            <a:endParaRPr lang="en-US" sz="2670" b="0" strike="noStrike" spc="-1" dirty="0">
-              <a:solidFill>
-                <a:srgbClr val="000000"/>
-              </a:solidFill>
-              <a:latin typeface="Arial"/>
-            </a:endParaRPr>
-          </a:p>
-          <a:p>
-            <a:pPr marL="1219320" lvl="1" indent="-423000">
-              <a:lnSpc>
-                <a:spcPct val="100000"/>
-              </a:lnSpc>
-              <a:buClr>
-                <a:srgbClr val="000000"/>
-              </a:buClr>
-              <a:buFont typeface="Arial"/>
-              <a:buChar char="•"/>
-            </a:pPr>
-            <a:r>
-              <a:rPr lang="en-US" sz="1870" b="0" strike="noStrike" spc="-1" dirty="0">
-                <a:solidFill>
-                  <a:srgbClr val="000000"/>
-                </a:solidFill>
-                <a:latin typeface="Arial"/>
-                <a:ea typeface="Arial"/>
-              </a:rPr>
-              <a:t>Still mixed integer programming in each iteration(LP in future work)</a:t>
-            </a:r>
-            <a:endParaRPr lang="en-US" sz="1870" b="0" strike="noStrike" spc="-1" dirty="0">
-              <a:solidFill>
-                <a:srgbClr val="000000"/>
-              </a:solidFill>
-              <a:latin typeface="Arial"/>
-            </a:endParaRPr>
-          </a:p>
-        </p:txBody>
-      </p:sp>
-      <p:sp>
-        <p:nvSpPr>
-          <p:cNvPr id="293" name="TextShape 2"/>
+        </p:txBody>
+      </p:sp>
+      <p:sp>
+        <p:nvSpPr>
+          <p:cNvPr id="296" name="TextShape 2"/>
           <p:cNvSpPr txBox="1"/>
           <p:nvPr/>
         </p:nvSpPr>
         <p:spPr>
           <a:xfrm>
-            <a:off x="8235720" y="305280"/>
-            <a:ext cx="3654000" cy="353160"/>
+            <a:off x="8737560" y="6356520"/>
+            <a:ext cx="2844360" cy="365760"/>
           </a:xfrm>
           <a:prstGeom prst="rect">
             <a:avLst/>
@@ -20844,218 +20635,6 @@
           </a:ln>
         </p:spPr>
         <p:txBody>
-          <a:bodyPr tIns="91440" bIns="91440"/>
-          <a:lstStyle/>
-          <a:p>
-            <a:pPr marL="609480" indent="-304560" algn="r">
-              <a:lnSpc>
-                <a:spcPct val="100000"/>
-              </a:lnSpc>
-            </a:pPr>
-            <a:r>
-              <a:rPr lang="en-US" sz="1870" b="0" strike="noStrike" spc="-1">
-                <a:solidFill>
-                  <a:srgbClr val="FFFFFF"/>
-                </a:solidFill>
-                <a:latin typeface="Arial"/>
-                <a:ea typeface="Arial"/>
-              </a:rPr>
-              <a:t>Heuristic 2</a:t>
-            </a:r>
-            <a:endParaRPr lang="en-US" sz="1870" b="0" strike="noStrike" spc="-1">
-              <a:solidFill>
-                <a:srgbClr val="000000"/>
-              </a:solidFill>
-              <a:latin typeface="Arial"/>
-            </a:endParaRPr>
-          </a:p>
-        </p:txBody>
-      </p:sp>
-      <p:sp>
-        <p:nvSpPr>
-          <p:cNvPr id="294" name="TextShape 3"/>
-          <p:cNvSpPr txBox="1"/>
-          <p:nvPr/>
-        </p:nvSpPr>
-        <p:spPr>
-          <a:xfrm>
-            <a:off x="8737560" y="6356520"/>
-            <a:ext cx="2844360" cy="365760"/>
-          </a:xfrm>
-          <a:prstGeom prst="rect">
-            <a:avLst/>
-          </a:prstGeom>
-          <a:noFill/>
-          <a:ln>
-            <a:noFill/>
-          </a:ln>
-        </p:spPr>
-        <p:txBody>
-          <a:bodyPr anchor="ctr"/>
-          <a:lstStyle/>
-          <a:p>
-            <a:pPr algn="r">
-              <a:lnSpc>
-                <a:spcPct val="100000"/>
-              </a:lnSpc>
-            </a:pPr>
-            <a:fld id="{61DC2E03-FD68-486D-AE98-2C8D0C3D7A76}" type="slidenum">
-              <a:rPr lang="en-US" sz="1600" b="0" strike="noStrike" spc="-1">
-                <a:solidFill>
-                  <a:srgbClr val="898989"/>
-                </a:solidFill>
-                <a:latin typeface="Arial"/>
-                <a:ea typeface="Arial"/>
-              </a:rPr>
-              <a:t>24</a:t>
-            </a:fld>
-            <a:endParaRPr lang="en-US" sz="1600" b="0" strike="noStrike" spc="-1">
-              <a:latin typeface="Times New Roman"/>
-            </a:endParaRPr>
-          </a:p>
-        </p:txBody>
-      </p:sp>
-    </p:spTree>
-  </p:cSld>
-  <p:clrMapOvr>
-    <a:masterClrMapping/>
-  </p:clrMapOvr>
-</p:sld>
-</file>
-
-<file path=ppt/slides/slide25.xml><?xml version="1.0" encoding="utf-8"?>
-<p:sld xmlns:a="http://schemas.openxmlformats.org/drawingml/2006/main" xmlns:r="http://schemas.openxmlformats.org/officeDocument/2006/relationships" xmlns:p="http://schemas.openxmlformats.org/presentationml/2006/main">
-  <p:cSld>
-    <p:spTree>
-      <p:nvGrpSpPr>
-        <p:cNvPr id="1" name=""/>
-        <p:cNvGrpSpPr/>
-        <p:nvPr/>
-      </p:nvGrpSpPr>
-      <p:grpSpPr>
-        <a:xfrm>
-          <a:off x="0" y="0"/>
-          <a:ext cx="0" cy="0"/>
-          <a:chOff x="0" y="0"/>
-          <a:chExt cx="0" cy="0"/>
-        </a:xfrm>
-      </p:grpSpPr>
-      <p:sp>
-        <p:nvSpPr>
-          <p:cNvPr id="295" name="TextShape 1"/>
-          <p:cNvSpPr txBox="1"/>
-          <p:nvPr/>
-        </p:nvSpPr>
-        <p:spPr>
-          <a:xfrm>
-            <a:off x="3252240" y="2547720"/>
-            <a:ext cx="5081040" cy="4174200"/>
-          </a:xfrm>
-          <a:prstGeom prst="rect">
-            <a:avLst/>
-          </a:prstGeom>
-          <a:noFill/>
-          <a:ln>
-            <a:noFill/>
-          </a:ln>
-        </p:spPr>
-        <p:txBody>
-          <a:bodyPr tIns="91440" bIns="91440"/>
-          <a:lstStyle/>
-          <a:p>
-            <a:pPr marL="609480" indent="-304560" algn="ctr">
-              <a:lnSpc>
-                <a:spcPct val="100000"/>
-              </a:lnSpc>
-            </a:pPr>
-            <a:r>
-              <a:rPr lang="en-US" sz="2670" b="1" strike="noStrike" spc="-1" dirty="0">
-                <a:solidFill>
-                  <a:srgbClr val="000000"/>
-                </a:solidFill>
-                <a:latin typeface="Arial"/>
-                <a:ea typeface="Arial"/>
-              </a:rPr>
-              <a:t>Thank you!</a:t>
-            </a:r>
-            <a:endParaRPr lang="en-US" sz="2670" b="0" strike="noStrike" spc="-1" dirty="0">
-              <a:solidFill>
-                <a:srgbClr val="000000"/>
-              </a:solidFill>
-              <a:latin typeface="Arial"/>
-            </a:endParaRPr>
-          </a:p>
-          <a:p>
-            <a:pPr marL="609480" indent="-304560" algn="ctr">
-              <a:lnSpc>
-                <a:spcPct val="100000"/>
-              </a:lnSpc>
-            </a:pPr>
-            <a:endParaRPr lang="en-US" sz="2670" b="0" strike="noStrike" spc="-1">
-              <a:solidFill>
-                <a:srgbClr val="000000"/>
-              </a:solidFill>
-              <a:latin typeface="Arial"/>
-            </a:endParaRPr>
-          </a:p>
-          <a:p>
-            <a:pPr marL="609480" indent="-304560" algn="ctr">
-              <a:lnSpc>
-                <a:spcPct val="100000"/>
-              </a:lnSpc>
-            </a:pPr>
-            <a:endParaRPr lang="en-US" sz="2670" b="0" strike="noStrike" spc="-1">
-              <a:solidFill>
-                <a:srgbClr val="000000"/>
-              </a:solidFill>
-              <a:latin typeface="Arial"/>
-            </a:endParaRPr>
-          </a:p>
-          <a:p>
-            <a:pPr marL="609480" indent="-304560" algn="ctr">
-              <a:lnSpc>
-                <a:spcPct val="100000"/>
-              </a:lnSpc>
-            </a:pPr>
-            <a:r>
-              <a:rPr lang="en-US" sz="2670" b="1" strike="noStrike" spc="-1" dirty="0">
-                <a:solidFill>
-                  <a:srgbClr val="000000"/>
-                </a:solidFill>
-                <a:latin typeface="Arial"/>
-                <a:ea typeface="Arial"/>
-              </a:rPr>
-              <a:t>Q&amp;A</a:t>
-            </a:r>
-            <a:endParaRPr lang="en-US" sz="2670" b="0" strike="noStrike" spc="-1" dirty="0">
-              <a:solidFill>
-                <a:srgbClr val="000000"/>
-              </a:solidFill>
-              <a:latin typeface="Arial"/>
-            </a:endParaRPr>
-          </a:p>
-        </p:txBody>
-      </p:sp>
-      <p:sp>
-        <p:nvSpPr>
-          <p:cNvPr id="296" name="TextShape 2"/>
-          <p:cNvSpPr txBox="1"/>
-          <p:nvPr/>
-        </p:nvSpPr>
-        <p:spPr>
-          <a:xfrm>
-            <a:off x="8737560" y="6356520"/>
-            <a:ext cx="2844360" cy="365760"/>
-          </a:xfrm>
-          <a:prstGeom prst="rect">
-            <a:avLst/>
-          </a:prstGeom>
-          <a:noFill/>
-          <a:ln>
-            <a:noFill/>
-          </a:ln>
-        </p:spPr>
-        <p:txBody>
           <a:bodyPr anchor="ctr"/>
           <a:lstStyle/>
           <a:p>
@@ -21072,7 +20651,7 @@
                 <a:latin typeface="Arial"/>
                 <a:ea typeface="Arial"/>
               </a:rPr>
-              <a:t>25</a:t>
+              <a:t>24</a:t>
             </a:fld>
             <a:endParaRPr lang="en-US" sz="1600" b="0" strike="noStrike" spc="-1" dirty="0">
               <a:latin typeface="Times New Roman"/>

</xml_diff>